<commit_message>
subindo alteração no dockerfile
</commit_message>
<xml_diff>
--- a/Documentação/arquitetura/diagrama_container.pptx
+++ b/Documentação/arquitetura/diagrama_container.pptx
@@ -259,7 +259,7 @@
           <a:p>
             <a:fld id="{8DC8D3FD-C638-4BC4-B8E7-DE301207CAF5}" type="datetimeFigureOut">
               <a:rPr lang="pt-BR" smtClean="0"/>
-              <a:t>26/11/2021</a:t>
+              <a:t>02/12/2021</a:t>
             </a:fld>
             <a:endParaRPr lang="pt-BR"/>
           </a:p>
@@ -457,7 +457,7 @@
           <a:p>
             <a:fld id="{8DC8D3FD-C638-4BC4-B8E7-DE301207CAF5}" type="datetimeFigureOut">
               <a:rPr lang="pt-BR" smtClean="0"/>
-              <a:t>26/11/2021</a:t>
+              <a:t>02/12/2021</a:t>
             </a:fld>
             <a:endParaRPr lang="pt-BR"/>
           </a:p>
@@ -665,7 +665,7 @@
           <a:p>
             <a:fld id="{8DC8D3FD-C638-4BC4-B8E7-DE301207CAF5}" type="datetimeFigureOut">
               <a:rPr lang="pt-BR" smtClean="0"/>
-              <a:t>26/11/2021</a:t>
+              <a:t>02/12/2021</a:t>
             </a:fld>
             <a:endParaRPr lang="pt-BR"/>
           </a:p>
@@ -863,7 +863,7 @@
           <a:p>
             <a:fld id="{8DC8D3FD-C638-4BC4-B8E7-DE301207CAF5}" type="datetimeFigureOut">
               <a:rPr lang="pt-BR" smtClean="0"/>
-              <a:t>26/11/2021</a:t>
+              <a:t>02/12/2021</a:t>
             </a:fld>
             <a:endParaRPr lang="pt-BR"/>
           </a:p>
@@ -1138,7 +1138,7 @@
           <a:p>
             <a:fld id="{8DC8D3FD-C638-4BC4-B8E7-DE301207CAF5}" type="datetimeFigureOut">
               <a:rPr lang="pt-BR" smtClean="0"/>
-              <a:t>26/11/2021</a:t>
+              <a:t>02/12/2021</a:t>
             </a:fld>
             <a:endParaRPr lang="pt-BR"/>
           </a:p>
@@ -1403,7 +1403,7 @@
           <a:p>
             <a:fld id="{8DC8D3FD-C638-4BC4-B8E7-DE301207CAF5}" type="datetimeFigureOut">
               <a:rPr lang="pt-BR" smtClean="0"/>
-              <a:t>26/11/2021</a:t>
+              <a:t>02/12/2021</a:t>
             </a:fld>
             <a:endParaRPr lang="pt-BR"/>
           </a:p>
@@ -1815,7 +1815,7 @@
           <a:p>
             <a:fld id="{8DC8D3FD-C638-4BC4-B8E7-DE301207CAF5}" type="datetimeFigureOut">
               <a:rPr lang="pt-BR" smtClean="0"/>
-              <a:t>26/11/2021</a:t>
+              <a:t>02/12/2021</a:t>
             </a:fld>
             <a:endParaRPr lang="pt-BR"/>
           </a:p>
@@ -1956,7 +1956,7 @@
           <a:p>
             <a:fld id="{8DC8D3FD-C638-4BC4-B8E7-DE301207CAF5}" type="datetimeFigureOut">
               <a:rPr lang="pt-BR" smtClean="0"/>
-              <a:t>26/11/2021</a:t>
+              <a:t>02/12/2021</a:t>
             </a:fld>
             <a:endParaRPr lang="pt-BR"/>
           </a:p>
@@ -2069,7 +2069,7 @@
           <a:p>
             <a:fld id="{8DC8D3FD-C638-4BC4-B8E7-DE301207CAF5}" type="datetimeFigureOut">
               <a:rPr lang="pt-BR" smtClean="0"/>
-              <a:t>26/11/2021</a:t>
+              <a:t>02/12/2021</a:t>
             </a:fld>
             <a:endParaRPr lang="pt-BR"/>
           </a:p>
@@ -2380,7 +2380,7 @@
           <a:p>
             <a:fld id="{8DC8D3FD-C638-4BC4-B8E7-DE301207CAF5}" type="datetimeFigureOut">
               <a:rPr lang="pt-BR" smtClean="0"/>
-              <a:t>26/11/2021</a:t>
+              <a:t>02/12/2021</a:t>
             </a:fld>
             <a:endParaRPr lang="pt-BR"/>
           </a:p>
@@ -2668,7 +2668,7 @@
           <a:p>
             <a:fld id="{8DC8D3FD-C638-4BC4-B8E7-DE301207CAF5}" type="datetimeFigureOut">
               <a:rPr lang="pt-BR" smtClean="0"/>
-              <a:t>26/11/2021</a:t>
+              <a:t>02/12/2021</a:t>
             </a:fld>
             <a:endParaRPr lang="pt-BR"/>
           </a:p>
@@ -2912,7 +2912,7 @@
           <a:p>
             <a:fld id="{8DC8D3FD-C638-4BC4-B8E7-DE301207CAF5}" type="datetimeFigureOut">
               <a:rPr lang="pt-BR" smtClean="0"/>
-              <a:t>26/11/2021</a:t>
+              <a:t>02/12/2021</a:t>
             </a:fld>
             <a:endParaRPr lang="pt-BR"/>
           </a:p>
@@ -4190,14 +4190,14 @@
           <p:cNvCxnSpPr>
             <a:cxnSpLocks/>
             <a:stCxn id="109" idx="1"/>
-            <a:endCxn id="70" idx="3"/>
+            <a:endCxn id="29" idx="3"/>
           </p:cNvCxnSpPr>
           <p:nvPr/>
         </p:nvCxnSpPr>
         <p:spPr>
           <a:xfrm rot="10800000" flipV="1">
-            <a:off x="2115724" y="3891427"/>
-            <a:ext cx="812927" cy="177775"/>
+            <a:off x="1914924" y="3891427"/>
+            <a:ext cx="1013727" cy="362307"/>
           </a:xfrm>
           <a:prstGeom prst="curvedConnector3">
             <a:avLst>

</xml_diff>